<commit_message>
Actualización de clase 4
</commit_message>
<xml_diff>
--- a/Semana4 - Ciclos/Clase-04-Ciclos.pptx
+++ b/Semana4 - Ciclos/Clase-04-Ciclos.pptx
@@ -229,7 +229,7 @@
           <a:p>
             <a:fld id="{522057E8-DCE3-42A0-A625-E25CA1AC41D9}" type="datetimeFigureOut">
               <a:rPr lang="en-US" smtClean="0"/>
-              <a:t>1/19/2022</a:t>
+              <a:t>2/14/2022</a:t>
             </a:fld>
             <a:endParaRPr lang="en-US"/>
           </a:p>
@@ -12170,6 +12170,47 @@
           </a:p>
         </p:txBody>
       </p:sp>
+      <p:sp>
+        <p:nvSpPr>
+          <p:cNvPr id="13" name="CuadroTexto 12">
+            <a:extLst>
+              <a:ext uri="{FF2B5EF4-FFF2-40B4-BE49-F238E27FC236}">
+                <a16:creationId xmlns:a16="http://schemas.microsoft.com/office/drawing/2014/main" id="{3058D1A4-1678-4DEF-AE60-AA7DF4682D55}"/>
+              </a:ext>
+            </a:extLst>
+          </p:cNvPr>
+          <p:cNvSpPr txBox="1"/>
+          <p:nvPr/>
+        </p:nvSpPr>
+        <p:spPr>
+          <a:xfrm>
+            <a:off x="1621586" y="4777186"/>
+            <a:ext cx="3044190" cy="1754326"/>
+          </a:xfrm>
+          <a:prstGeom prst="rect">
+            <a:avLst/>
+          </a:prstGeom>
+          <a:noFill/>
+        </p:spPr>
+        <p:txBody>
+          <a:bodyPr wrap="square">
+            <a:spAutoFit/>
+          </a:bodyPr>
+          <a:lstStyle/>
+          <a:p>
+            <a:r>
+              <a:rPr lang="es-CO" dirty="0">
+                <a:hlinkClick r:id="rId3"/>
+              </a:rPr>
+              <a:t>https://github.com/urregozw/ST0242-2022-Juan_Luis/blob/main/Semana4%20-%20Ciclos/E03_13_while.java</a:t>
+            </a:r>
+            <a:endParaRPr lang="es-CO" dirty="0"/>
+          </a:p>
+          <a:p>
+            <a:endParaRPr lang="es-CO" dirty="0"/>
+          </a:p>
+        </p:txBody>
+      </p:sp>
     </p:spTree>
     <p:extLst>
       <p:ext uri="{BB962C8B-B14F-4D97-AF65-F5344CB8AC3E}">
@@ -13361,7 +13402,12 @@
             <p:ph type="title"/>
           </p:nvPr>
         </p:nvSpPr>
-        <p:spPr/>
+        <p:spPr>
+          <a:xfrm>
+            <a:off x="836839" y="189438"/>
+            <a:ext cx="9666016" cy="1018902"/>
+          </a:xfrm>
+        </p:spPr>
         <p:txBody>
           <a:bodyPr/>
           <a:lstStyle/>
@@ -13447,6 +13493,47 @@
           </a:fontRef>
         </p:style>
       </p:pic>
+      <p:sp>
+        <p:nvSpPr>
+          <p:cNvPr id="7" name="CuadroTexto 6">
+            <a:extLst>
+              <a:ext uri="{FF2B5EF4-FFF2-40B4-BE49-F238E27FC236}">
+                <a16:creationId xmlns:a16="http://schemas.microsoft.com/office/drawing/2014/main" id="{4DBD98BA-8032-42ED-8C56-98DD0D2B0B1E}"/>
+              </a:ext>
+            </a:extLst>
+          </p:cNvPr>
+          <p:cNvSpPr txBox="1"/>
+          <p:nvPr/>
+        </p:nvSpPr>
+        <p:spPr>
+          <a:xfrm>
+            <a:off x="9813867" y="0"/>
+            <a:ext cx="2378133" cy="2031325"/>
+          </a:xfrm>
+          <a:prstGeom prst="rect">
+            <a:avLst/>
+          </a:prstGeom>
+          <a:noFill/>
+        </p:spPr>
+        <p:txBody>
+          <a:bodyPr wrap="square">
+            <a:spAutoFit/>
+          </a:bodyPr>
+          <a:lstStyle/>
+          <a:p>
+            <a:r>
+              <a:rPr lang="es-CO" dirty="0">
+                <a:hlinkClick r:id="rId3"/>
+              </a:rPr>
+              <a:t>https://github.com/urregozw/ST0242-2022-Juan_Luis/blob/main/Semana4%20-%20Ciclos/E04_16_bucleCentinela.java</a:t>
+            </a:r>
+            <a:endParaRPr lang="es-CO" dirty="0"/>
+          </a:p>
+          <a:p>
+            <a:endParaRPr lang="es-CO" dirty="0"/>
+          </a:p>
+        </p:txBody>
+      </p:sp>
     </p:spTree>
     <p:extLst>
       <p:ext uri="{BB962C8B-B14F-4D97-AF65-F5344CB8AC3E}">
@@ -15955,6 +16042,47 @@
           </a:p>
         </p:txBody>
       </p:sp>
+      <p:sp>
+        <p:nvSpPr>
+          <p:cNvPr id="9" name="CuadroTexto 8">
+            <a:extLst>
+              <a:ext uri="{FF2B5EF4-FFF2-40B4-BE49-F238E27FC236}">
+                <a16:creationId xmlns:a16="http://schemas.microsoft.com/office/drawing/2014/main" id="{FF3563C4-8DFD-4B8A-B6C7-97913A20A12B}"/>
+              </a:ext>
+            </a:extLst>
+          </p:cNvPr>
+          <p:cNvSpPr txBox="1"/>
+          <p:nvPr/>
+        </p:nvSpPr>
+        <p:spPr>
+          <a:xfrm>
+            <a:off x="1976830" y="322311"/>
+            <a:ext cx="1925250" cy="2308324"/>
+          </a:xfrm>
+          <a:prstGeom prst="rect">
+            <a:avLst/>
+          </a:prstGeom>
+          <a:noFill/>
+        </p:spPr>
+        <p:txBody>
+          <a:bodyPr wrap="square">
+            <a:spAutoFit/>
+          </a:bodyPr>
+          <a:lstStyle/>
+          <a:p>
+            <a:r>
+              <a:rPr lang="es-CO" dirty="0">
+                <a:hlinkClick r:id="rId5"/>
+              </a:rPr>
+              <a:t>https://github.com/urregozw/ST0242-2022-Juan_Luis/blob/main/Semana4%20-%20Ciclos/E05_21_DoWhile.java</a:t>
+            </a:r>
+            <a:endParaRPr lang="es-CO" dirty="0"/>
+          </a:p>
+          <a:p>
+            <a:endParaRPr lang="es-CO" dirty="0"/>
+          </a:p>
+        </p:txBody>
+      </p:sp>
     </p:spTree>
     <p:extLst>
       <p:ext uri="{BB962C8B-B14F-4D97-AF65-F5344CB8AC3E}">
@@ -21047,6 +21175,47 @@
           </a:fontRef>
         </p:style>
       </p:pic>
+      <p:sp>
+        <p:nvSpPr>
+          <p:cNvPr id="8" name="CuadroTexto 7">
+            <a:extLst>
+              <a:ext uri="{FF2B5EF4-FFF2-40B4-BE49-F238E27FC236}">
+                <a16:creationId xmlns:a16="http://schemas.microsoft.com/office/drawing/2014/main" id="{FBF665F6-D934-46D5-81B1-86CBB4F3715A}"/>
+              </a:ext>
+            </a:extLst>
+          </p:cNvPr>
+          <p:cNvSpPr txBox="1"/>
+          <p:nvPr/>
+        </p:nvSpPr>
+        <p:spPr>
+          <a:xfrm>
+            <a:off x="7783830" y="222069"/>
+            <a:ext cx="6103620" cy="1200329"/>
+          </a:xfrm>
+          <a:prstGeom prst="rect">
+            <a:avLst/>
+          </a:prstGeom>
+          <a:noFill/>
+        </p:spPr>
+        <p:txBody>
+          <a:bodyPr wrap="square">
+            <a:spAutoFit/>
+          </a:bodyPr>
+          <a:lstStyle/>
+          <a:p>
+            <a:r>
+              <a:rPr lang="es-CO" dirty="0">
+                <a:hlinkClick r:id="rId4"/>
+              </a:rPr>
+              <a:t>https://github.com/urregozw/ST0242-2022-Juan_Luis/blob/main/Semana4%20-%20Ciclos/E01_04_bucle.java</a:t>
+            </a:r>
+            <a:endParaRPr lang="es-CO" dirty="0"/>
+          </a:p>
+          <a:p>
+            <a:endParaRPr lang="es-CO" dirty="0"/>
+          </a:p>
+        </p:txBody>
+      </p:sp>
     </p:spTree>
     <p:extLst>
       <p:ext uri="{BB962C8B-B14F-4D97-AF65-F5344CB8AC3E}">
@@ -23448,6 +23617,47 @@
               </a:rPr>
               <a:t>¿Qué imprime?</a:t>
             </a:r>
+          </a:p>
+        </p:txBody>
+      </p:sp>
+      <p:sp>
+        <p:nvSpPr>
+          <p:cNvPr id="9" name="CuadroTexto 8">
+            <a:extLst>
+              <a:ext uri="{FF2B5EF4-FFF2-40B4-BE49-F238E27FC236}">
+                <a16:creationId xmlns:a16="http://schemas.microsoft.com/office/drawing/2014/main" id="{00A0C957-B0D0-48A2-B56A-89CCFE938319}"/>
+              </a:ext>
+            </a:extLst>
+          </p:cNvPr>
+          <p:cNvSpPr txBox="1"/>
+          <p:nvPr/>
+        </p:nvSpPr>
+        <p:spPr>
+          <a:xfrm>
+            <a:off x="8275329" y="137682"/>
+            <a:ext cx="3916671" cy="1477328"/>
+          </a:xfrm>
+          <a:prstGeom prst="rect">
+            <a:avLst/>
+          </a:prstGeom>
+          <a:noFill/>
+        </p:spPr>
+        <p:txBody>
+          <a:bodyPr wrap="square">
+            <a:spAutoFit/>
+          </a:bodyPr>
+          <a:lstStyle/>
+          <a:p>
+            <a:r>
+              <a:rPr lang="es-CO" dirty="0">
+                <a:hlinkClick r:id="rId4"/>
+              </a:rPr>
+              <a:t>https://github.com/urregozw/ST0242-2022-Juan_Luis/blob/main/Semana4%20-%20Ciclos/E02_08_bucle2.java</a:t>
+            </a:r>
+            <a:endParaRPr lang="es-CO" dirty="0"/>
+          </a:p>
+          <a:p>
+            <a:endParaRPr lang="es-CO" dirty="0"/>
           </a:p>
         </p:txBody>
       </p:sp>

</xml_diff>